<commit_message>
Updated pptx with pros and cons
</commit_message>
<xml_diff>
--- a/Automapper.pptx
+++ b/Automapper.pptx
@@ -5,7 +5,7 @@
     <p:sldMasterId id="2147483648" r:id="rId1"/>
   </p:sldMasterIdLst>
   <p:notesMasterIdLst>
-    <p:notesMasterId r:id="rId8"/>
+    <p:notesMasterId r:id="rId9"/>
   </p:notesMasterIdLst>
   <p:sldIdLst>
     <p:sldId id="258" r:id="rId2"/>
@@ -14,6 +14,7 @@
     <p:sldId id="257" r:id="rId5"/>
     <p:sldId id="259" r:id="rId6"/>
     <p:sldId id="261" r:id="rId7"/>
+    <p:sldId id="262" r:id="rId8"/>
   </p:sldIdLst>
   <p:sldSz cx="12192000" cy="6858000"/>
   <p:notesSz cx="6858000" cy="9144000"/>
@@ -112,6 +113,14 @@
       </a:defRPr>
     </a:lvl9pPr>
   </p:defaultTextStyle>
+  <p:extLst>
+    <p:ext uri="{EFAFB233-063F-42B5-8137-9DF3F51BA10A}">
+      <p15:sldGuideLst xmlns:p15="http://schemas.microsoft.com/office/powerpoint/2012/main"/>
+    </p:ext>
+    <p:ext uri="{2D200454-40CA-4A62-9FC3-DE9A4176ACB9}">
+      <p15:notesGuideLst xmlns:p15="http://schemas.microsoft.com/office/powerpoint/2012/main"/>
+    </p:ext>
+  </p:extLst>
 </p:presentation>
 </file>
 
@@ -712,6 +721,90 @@
     <p:extLst>
       <p:ext uri="{BB962C8B-B14F-4D97-AF65-F5344CB8AC3E}">
         <p14:creationId xmlns:p14="http://schemas.microsoft.com/office/powerpoint/2010/main" val="3884313409"/>
+      </p:ext>
+    </p:extLst>
+  </p:cSld>
+  <p:clrMapOvr>
+    <a:masterClrMapping/>
+  </p:clrMapOvr>
+</p:notes>
+</file>
+
+<file path=ppt/notesSlides/notesSlide4.xml><?xml version="1.0" encoding="utf-8"?>
+<p:notes xmlns:a="http://schemas.openxmlformats.org/drawingml/2006/main" xmlns:r="http://schemas.openxmlformats.org/officeDocument/2006/relationships" xmlns:p="http://schemas.openxmlformats.org/presentationml/2006/main">
+  <p:cSld>
+    <p:spTree>
+      <p:nvGrpSpPr>
+        <p:cNvPr id="1" name=""/>
+        <p:cNvGrpSpPr/>
+        <p:nvPr/>
+      </p:nvGrpSpPr>
+      <p:grpSpPr>
+        <a:xfrm>
+          <a:off x="0" y="0"/>
+          <a:ext cx="0" cy="0"/>
+          <a:chOff x="0" y="0"/>
+          <a:chExt cx="0" cy="0"/>
+        </a:xfrm>
+      </p:grpSpPr>
+      <p:sp>
+        <p:nvSpPr>
+          <p:cNvPr id="2" name="Slide Image Placeholder 1"/>
+          <p:cNvSpPr>
+            <a:spLocks noGrp="1" noRot="1" noChangeAspect="1"/>
+          </p:cNvSpPr>
+          <p:nvPr>
+            <p:ph type="sldImg"/>
+          </p:nvPr>
+        </p:nvSpPr>
+        <p:spPr/>
+      </p:sp>
+      <p:sp>
+        <p:nvSpPr>
+          <p:cNvPr id="3" name="Notes Placeholder 2"/>
+          <p:cNvSpPr>
+            <a:spLocks noGrp="1"/>
+          </p:cNvSpPr>
+          <p:nvPr>
+            <p:ph type="body" idx="1"/>
+          </p:nvPr>
+        </p:nvSpPr>
+        <p:spPr/>
+        <p:txBody>
+          <a:bodyPr/>
+          <a:lstStyle/>
+          <a:p>
+            <a:endParaRPr lang="en-IE" dirty="0"/>
+          </a:p>
+        </p:txBody>
+      </p:sp>
+      <p:sp>
+        <p:nvSpPr>
+          <p:cNvPr id="4" name="Slide Number Placeholder 3"/>
+          <p:cNvSpPr>
+            <a:spLocks noGrp="1"/>
+          </p:cNvSpPr>
+          <p:nvPr>
+            <p:ph type="sldNum" sz="quarter" idx="10"/>
+          </p:nvPr>
+        </p:nvSpPr>
+        <p:spPr/>
+        <p:txBody>
+          <a:bodyPr/>
+          <a:lstStyle/>
+          <a:p>
+            <a:fld id="{61BA1CE6-27B9-4E34-A11F-EB48FC17ACCD}" type="slidenum">
+              <a:rPr lang="en-IE" smtClean="0"/>
+              <a:t>7</a:t>
+            </a:fld>
+            <a:endParaRPr lang="en-IE"/>
+          </a:p>
+        </p:txBody>
+      </p:sp>
+    </p:spTree>
+    <p:extLst>
+      <p:ext uri="{BB962C8B-B14F-4D97-AF65-F5344CB8AC3E}">
+        <p14:creationId xmlns:p14="http://schemas.microsoft.com/office/powerpoint/2010/main" val="373729709"/>
       </p:ext>
     </p:extLst>
   </p:cSld>
@@ -6594,31 +6687,7 @@
                   <a:schemeClr val="tx1"/>
                 </a:solidFill>
               </a:rPr>
-              <a:t>Testing mapping code </a:t>
-            </a:r>
-            <a:r>
-              <a:rPr lang="en-IE" sz="3200" dirty="0">
-                <a:solidFill>
-                  <a:schemeClr val="tx1"/>
-                </a:solidFill>
-              </a:rPr>
-              <a:t>is </a:t>
-            </a:r>
-            <a:r>
-              <a:rPr lang="en-IE" sz="3200" dirty="0">
-                <a:solidFill>
-                  <a:schemeClr val="tx1"/>
-                </a:solidFill>
-              </a:rPr>
-              <a:t>boring</a:t>
-            </a:r>
-            <a:r>
-              <a:rPr lang="en-IE" sz="3200" dirty="0">
-                <a:solidFill>
-                  <a:schemeClr val="tx1"/>
-                </a:solidFill>
-              </a:rPr>
-              <a:t>.</a:t>
+              <a:t>Testing mapping code is boring.</a:t>
             </a:r>
           </a:p>
           <a:p>
@@ -7290,6 +7359,247 @@
     <p:extLst>
       <p:ext uri="{BB962C8B-B14F-4D97-AF65-F5344CB8AC3E}">
         <p14:creationId xmlns:p14="http://schemas.microsoft.com/office/powerpoint/2010/main" val="1280703545"/>
+      </p:ext>
+    </p:extLst>
+  </p:cSld>
+  <p:clrMapOvr>
+    <a:masterClrMapping/>
+  </p:clrMapOvr>
+  <p:timing>
+    <p:tnLst>
+      <p:par>
+        <p:cTn id="1" dur="indefinite" restart="never" nodeType="tmRoot"/>
+      </p:par>
+    </p:tnLst>
+  </p:timing>
+</p:sld>
+</file>
+
+<file path=ppt/slides/slide7.xml><?xml version="1.0" encoding="utf-8"?>
+<p:sld xmlns:a="http://schemas.openxmlformats.org/drawingml/2006/main" xmlns:r="http://schemas.openxmlformats.org/officeDocument/2006/relationships" xmlns:p="http://schemas.openxmlformats.org/presentationml/2006/main">
+  <p:cSld>
+    <p:spTree>
+      <p:nvGrpSpPr>
+        <p:cNvPr id="1" name=""/>
+        <p:cNvGrpSpPr/>
+        <p:nvPr/>
+      </p:nvGrpSpPr>
+      <p:grpSpPr>
+        <a:xfrm>
+          <a:off x="0" y="0"/>
+          <a:ext cx="0" cy="0"/>
+          <a:chOff x="0" y="0"/>
+          <a:chExt cx="0" cy="0"/>
+        </a:xfrm>
+      </p:grpSpPr>
+      <p:sp>
+        <p:nvSpPr>
+          <p:cNvPr id="2" name="Title 1"/>
+          <p:cNvSpPr>
+            <a:spLocks noGrp="1"/>
+          </p:cNvSpPr>
+          <p:nvPr>
+            <p:ph type="ctrTitle"/>
+          </p:nvPr>
+        </p:nvSpPr>
+        <p:spPr>
+          <a:xfrm>
+            <a:off x="684212" y="749968"/>
+            <a:ext cx="8001000" cy="1463842"/>
+          </a:xfrm>
+        </p:spPr>
+        <p:txBody>
+          <a:bodyPr>
+            <a:normAutofit fontScale="90000"/>
+          </a:bodyPr>
+          <a:lstStyle/>
+          <a:p>
+            <a:r>
+              <a:rPr lang="en-IE" dirty="0" err="1" smtClean="0"/>
+              <a:t>Automapper</a:t>
+            </a:r>
+            <a:r>
+              <a:rPr lang="en-IE" dirty="0" smtClean="0"/>
+              <a:t> </a:t>
+            </a:r>
+            <a:r>
+              <a:rPr lang="en-IE" dirty="0" smtClean="0"/>
+              <a:t>Pros &amp; cons</a:t>
+            </a:r>
+            <a:endParaRPr lang="en-IE" dirty="0"/>
+          </a:p>
+        </p:txBody>
+      </p:sp>
+      <p:sp>
+        <p:nvSpPr>
+          <p:cNvPr id="3" name="Subtitle 2"/>
+          <p:cNvSpPr>
+            <a:spLocks noGrp="1"/>
+          </p:cNvSpPr>
+          <p:nvPr>
+            <p:ph type="subTitle" idx="1"/>
+          </p:nvPr>
+        </p:nvSpPr>
+        <p:spPr>
+          <a:xfrm>
+            <a:off x="684211" y="2679033"/>
+            <a:ext cx="10689641" cy="3497178"/>
+          </a:xfrm>
+        </p:spPr>
+        <p:txBody>
+          <a:bodyPr>
+            <a:normAutofit fontScale="92500" lnSpcReduction="20000"/>
+          </a:bodyPr>
+          <a:lstStyle/>
+          <a:p>
+            <a:r>
+              <a:rPr lang="en-IE" sz="1800" b="1" dirty="0"/>
+              <a:t>For</a:t>
+            </a:r>
+          </a:p>
+          <a:p>
+            <a:pPr marL="285750" indent="-285750">
+              <a:buFont typeface="Arial" panose="020B0604020202020204" pitchFamily="34" charset="0"/>
+              <a:buChar char="•"/>
+            </a:pPr>
+            <a:r>
+              <a:rPr lang="en-IE" sz="1800" dirty="0"/>
+              <a:t>Easy to set up.</a:t>
+            </a:r>
+          </a:p>
+          <a:p>
+            <a:pPr marL="285750" indent="-285750">
+              <a:buFont typeface="Arial" panose="020B0604020202020204" pitchFamily="34" charset="0"/>
+              <a:buChar char="•"/>
+            </a:pPr>
+            <a:r>
+              <a:rPr lang="en-IE" sz="1800" dirty="0"/>
+              <a:t>Easy to invoke.</a:t>
+            </a:r>
+          </a:p>
+          <a:p>
+            <a:pPr marL="285750" indent="-285750">
+              <a:buFont typeface="Arial" panose="020B0604020202020204" pitchFamily="34" charset="0"/>
+              <a:buChar char="•"/>
+            </a:pPr>
+            <a:r>
+              <a:rPr lang="en-IE" sz="1800" dirty="0"/>
+              <a:t>Looks like magic.</a:t>
+            </a:r>
+          </a:p>
+          <a:p>
+            <a:r>
+              <a:rPr lang="en-IE" sz="1800" b="1" dirty="0"/>
+              <a:t>Against</a:t>
+            </a:r>
+          </a:p>
+          <a:p>
+            <a:pPr marL="285750" indent="-285750">
+              <a:buFont typeface="Arial" panose="020B0604020202020204" pitchFamily="34" charset="0"/>
+              <a:buChar char="•"/>
+            </a:pPr>
+            <a:r>
+              <a:rPr lang="en-IE" sz="1800" dirty="0"/>
+              <a:t>It's really </a:t>
+            </a:r>
+            <a:r>
+              <a:rPr lang="en-IE" sz="1800" dirty="0" err="1"/>
+              <a:t>sloooowww</a:t>
+            </a:r>
+            <a:r>
+              <a:rPr lang="en-IE" sz="1800" dirty="0" smtClean="0"/>
+              <a:t>.</a:t>
+            </a:r>
+          </a:p>
+          <a:p>
+            <a:pPr marL="285750" indent="-285750">
+              <a:buFont typeface="Arial" panose="020B0604020202020204" pitchFamily="34" charset="0"/>
+              <a:buChar char="•"/>
+            </a:pPr>
+            <a:r>
+              <a:rPr lang="en-IE" sz="1800" dirty="0" smtClean="0"/>
+              <a:t>Requires </a:t>
+            </a:r>
+            <a:r>
+              <a:rPr lang="en-IE" sz="1800" dirty="0"/>
+              <a:t>messy dependency resolution.</a:t>
+            </a:r>
+          </a:p>
+          <a:p>
+            <a:pPr marL="285750" indent="-285750">
+              <a:buFont typeface="Arial" panose="020B0604020202020204" pitchFamily="34" charset="0"/>
+              <a:buChar char="•"/>
+            </a:pPr>
+            <a:r>
+              <a:rPr lang="en-IE" sz="1800" dirty="0"/>
+              <a:t>Generally leads to too many assembly references wherever the god-object mapper is defined.</a:t>
+            </a:r>
+          </a:p>
+          <a:p>
+            <a:pPr marL="285750" indent="-285750">
+              <a:buFont typeface="Arial" panose="020B0604020202020204" pitchFamily="34" charset="0"/>
+              <a:buChar char="•"/>
+            </a:pPr>
+            <a:r>
+              <a:rPr lang="en-IE" sz="1800" dirty="0"/>
+              <a:t>Ends up requiring more custom mapping code than explicit mapping code would have needed anyway</a:t>
+            </a:r>
+            <a:r>
+              <a:rPr lang="en-IE" sz="1800" dirty="0" smtClean="0"/>
+              <a:t>.</a:t>
+            </a:r>
+            <a:endParaRPr lang="en-IE" sz="1800" dirty="0"/>
+          </a:p>
+          <a:p>
+            <a:pPr marL="342900" indent="-342900">
+              <a:lnSpc>
+                <a:spcPct val="220000"/>
+              </a:lnSpc>
+              <a:buFont typeface="Arial" panose="020B0604020202020204" pitchFamily="34" charset="0"/>
+              <a:buChar char="•"/>
+            </a:pPr>
+            <a:endParaRPr lang="en-IE" sz="3200" dirty="0">
+              <a:solidFill>
+                <a:schemeClr val="tx1"/>
+              </a:solidFill>
+            </a:endParaRPr>
+          </a:p>
+        </p:txBody>
+      </p:sp>
+      <p:pic>
+        <p:nvPicPr>
+          <p:cNvPr id="4" name="Picture 3"/>
+          <p:cNvPicPr>
+            <a:picLocks noChangeAspect="1"/>
+          </p:cNvPicPr>
+          <p:nvPr/>
+        </p:nvPicPr>
+        <p:blipFill>
+          <a:blip r:embed="rId3">
+            <a:extLst>
+              <a:ext uri="{28A0092B-C50C-407E-A947-70E740481C1C}">
+                <a14:useLocalDpi xmlns:a14="http://schemas.microsoft.com/office/drawing/2010/main" val="0"/>
+              </a:ext>
+            </a:extLst>
+          </a:blip>
+          <a:stretch>
+            <a:fillRect/>
+          </a:stretch>
+        </p:blipFill>
+        <p:spPr>
+          <a:xfrm>
+            <a:off x="684212" y="685800"/>
+            <a:ext cx="4877223" cy="497883"/>
+          </a:xfrm>
+          <a:prstGeom prst="rect">
+            <a:avLst/>
+          </a:prstGeom>
+        </p:spPr>
+      </p:pic>
+    </p:spTree>
+    <p:extLst>
+      <p:ext uri="{BB962C8B-B14F-4D97-AF65-F5344CB8AC3E}">
+        <p14:creationId xmlns:p14="http://schemas.microsoft.com/office/powerpoint/2010/main" val="3803464820"/>
       </p:ext>
     </p:extLst>
   </p:cSld>

</xml_diff>